<commit_message>
Finalizing 0.1.0 test docs
</commit_message>
<xml_diff>
--- a/Documentation/workflow_summaries.pptx
+++ b/Documentation/workflow_summaries.pptx
@@ -6,6 +6,7 @@
   </p:sldMasterIdLst>
   <p:sldIdLst>
     <p:sldId id="256" r:id="rId3"/>
+    <p:sldId id="257" r:id="rId4"/>
   </p:sldIdLst>
   <p:sldSz cx="7559675" cy="10080625"/>
   <p:notesSz cx="7559675" cy="10691813"/>
@@ -63,7 +64,7 @@
         <p:txBody>
           <a:bodyPr/>
           <a:p>
-            <a:fld id="{87F6BFF5-4CE6-4CAD-A52F-2B30D88FCABD}" type="slidenum">
+            <a:fld id="{80201346-3490-444D-933C-443D594A7A34}" type="slidenum">
               <a:t>&lt;#&gt;</a:t>
             </a:fld>
           </a:p>
@@ -251,7 +252,7 @@
         <p:txBody>
           <a:bodyPr/>
           <a:p>
-            <a:fld id="{3757BE4A-4481-4622-AACB-61D5096819A3}" type="slidenum">
+            <a:fld id="{007874ED-8E5A-46E3-95D7-BF480CD59A51}" type="slidenum">
               <a:t>&lt;#&gt;</a:t>
             </a:fld>
           </a:p>
@@ -507,7 +508,7 @@
         <p:txBody>
           <a:bodyPr/>
           <a:p>
-            <a:fld id="{D3616377-2973-46EA-9CE5-C09E53B56272}" type="slidenum">
+            <a:fld id="{04E4CA06-2066-44C5-BBCD-83CD1A3EBD90}" type="slidenum">
               <a:t>&lt;#&gt;</a:t>
             </a:fld>
           </a:p>
@@ -831,7 +832,7 @@
         <p:txBody>
           <a:bodyPr/>
           <a:p>
-            <a:fld id="{55F8A096-76CB-4B06-9913-11522C5CA056}" type="slidenum">
+            <a:fld id="{443E29D3-AD21-45B8-A1DE-361B565998A0}" type="slidenum">
               <a:t>&lt;#&gt;</a:t>
             </a:fld>
           </a:p>
@@ -988,7 +989,7 @@
         <p:txBody>
           <a:bodyPr/>
           <a:p>
-            <a:fld id="{B7636383-3878-4719-8FE7-E9CC439A9773}" type="slidenum">
+            <a:fld id="{0C2D8438-2294-4C0D-A63D-8EEB122903FA}" type="slidenum">
               <a:t>&lt;#&gt;</a:t>
             </a:fld>
           </a:p>
@@ -1142,7 +1143,7 @@
         <p:txBody>
           <a:bodyPr/>
           <a:p>
-            <a:fld id="{DAB50F05-2E78-43B3-A87D-A83576E0528A}" type="slidenum">
+            <a:fld id="{D4EA312E-D809-4D26-8CB6-41847A572AAB}" type="slidenum">
               <a:t>&lt;#&gt;</a:t>
             </a:fld>
           </a:p>
@@ -1330,7 +1331,7 @@
         <p:txBody>
           <a:bodyPr/>
           <a:p>
-            <a:fld id="{00DB6B66-4400-41B5-83A7-D95D201E9D03}" type="slidenum">
+            <a:fld id="{6B261BF4-6DF1-4301-A046-683C9F1AAEFA}" type="slidenum">
               <a:t>&lt;#&gt;</a:t>
             </a:fld>
           </a:p>
@@ -1450,7 +1451,7 @@
         <p:txBody>
           <a:bodyPr/>
           <a:p>
-            <a:fld id="{E87A2336-E208-44CA-8042-00555CF82E6C}" type="slidenum">
+            <a:fld id="{3E283086-E895-4ACD-902F-FA5D93F87EFC}" type="slidenum">
               <a:t>&lt;#&gt;</a:t>
             </a:fld>
           </a:p>
@@ -1570,7 +1571,7 @@
         <p:txBody>
           <a:bodyPr/>
           <a:p>
-            <a:fld id="{F634B1CB-C582-4E95-A3E7-7E4E9C8C6867}" type="slidenum">
+            <a:fld id="{5ACDCE11-5A23-4C5A-819B-48A84B7EBF92}" type="slidenum">
               <a:t>&lt;#&gt;</a:t>
             </a:fld>
           </a:p>
@@ -1792,7 +1793,7 @@
         <p:txBody>
           <a:bodyPr/>
           <a:p>
-            <a:fld id="{45EE04C9-25A9-4E3D-8DFE-EDC90E70DECE}" type="slidenum">
+            <a:fld id="{7642447F-E0C5-4432-87D8-1236FFFEC036}" type="slidenum">
               <a:t>&lt;#&gt;</a:t>
             </a:fld>
           </a:p>
@@ -2014,7 +2015,7 @@
         <p:txBody>
           <a:bodyPr/>
           <a:p>
-            <a:fld id="{50B15B84-57DB-4BB5-83EA-1E1CF16D4CDB}" type="slidenum">
+            <a:fld id="{EF180531-8175-4CB5-B5A7-B5E35F96EADE}" type="slidenum">
               <a:t>&lt;#&gt;</a:t>
             </a:fld>
           </a:p>
@@ -2236,7 +2237,7 @@
         <p:txBody>
           <a:bodyPr/>
           <a:p>
-            <a:fld id="{29F4F83C-2825-4F6A-B1A8-0658F22333DC}" type="slidenum">
+            <a:fld id="{F1A0627F-DFBB-4EE2-9A00-517B48EDFDF9}" type="slidenum">
               <a:t>&lt;#&gt;</a:t>
             </a:fld>
           </a:p>
@@ -2648,7 +2649,7 @@
             <a:pPr algn="r">
               <a:buNone/>
             </a:pPr>
-            <a:fld id="{B403D06F-DB42-4408-8825-3E9543BD73BE}" type="slidenum">
+            <a:fld id="{46D6F125-127B-44C8-8908-C298D4876293}" type="slidenum">
               <a:rPr b="0" lang="fr-CH" sz="1400" spc="-1" strike="noStrike">
                 <a:latin typeface="Times New Roman"/>
               </a:rPr>
@@ -2705,7 +2706,7 @@
         </p:nvSpPr>
         <p:spPr>
           <a:xfrm>
-            <a:off x="2520000" y="1620000"/>
+            <a:off x="3420000" y="1620000"/>
             <a:ext cx="2520000" cy="900000"/>
           </a:xfrm>
           <a:prstGeom prst="rect">
@@ -2754,7 +2755,7 @@
         </p:nvSpPr>
         <p:spPr>
           <a:xfrm>
-            <a:off x="720000" y="4320000"/>
+            <a:off x="1980000" y="5040000"/>
             <a:ext cx="2520000" cy="900000"/>
           </a:xfrm>
           <a:prstGeom prst="rect">
@@ -2803,7 +2804,7 @@
         </p:nvSpPr>
         <p:spPr>
           <a:xfrm>
-            <a:off x="2520000" y="360000"/>
+            <a:off x="3420000" y="360000"/>
             <a:ext cx="2520000" cy="900000"/>
           </a:xfrm>
           <a:prstGeom prst="rect">
@@ -2852,7 +2853,7 @@
         </p:nvSpPr>
         <p:spPr>
           <a:xfrm>
-            <a:off x="2520000" y="2880000"/>
+            <a:off x="3420000" y="2880000"/>
             <a:ext cx="2520000" cy="900000"/>
           </a:xfrm>
           <a:prstGeom prst="rect">
@@ -2901,7 +2902,7 @@
         </p:nvSpPr>
         <p:spPr>
           <a:xfrm>
-            <a:off x="720000" y="5400000"/>
+            <a:off x="1980000" y="6120000"/>
             <a:ext cx="2520000" cy="900000"/>
           </a:xfrm>
           <a:prstGeom prst="rect">
@@ -2950,7 +2951,7 @@
         </p:nvSpPr>
         <p:spPr>
           <a:xfrm>
-            <a:off x="720000" y="6480000"/>
+            <a:off x="1980000" y="7200000"/>
             <a:ext cx="2520000" cy="900000"/>
           </a:xfrm>
           <a:prstGeom prst="rect">
@@ -2999,7 +3000,7 @@
         </p:nvSpPr>
         <p:spPr>
           <a:xfrm>
-            <a:off x="4320000" y="7560000"/>
+            <a:off x="4860000" y="7560000"/>
             <a:ext cx="2520000" cy="900000"/>
           </a:xfrm>
           <a:prstGeom prst="rect">
@@ -3048,7 +3049,7 @@
         </p:nvSpPr>
         <p:spPr>
           <a:xfrm>
-            <a:off x="2520000" y="9000000"/>
+            <a:off x="3240000" y="9000000"/>
             <a:ext cx="2520000" cy="900000"/>
           </a:xfrm>
           <a:prstGeom prst="rect">
@@ -3097,7 +3098,7 @@
         </p:nvSpPr>
         <p:spPr>
           <a:xfrm>
-            <a:off x="3780000" y="1260000"/>
+            <a:off x="4680000" y="1260000"/>
             <a:ext cx="0" cy="360000"/>
           </a:xfrm>
           <a:prstGeom prst="line">
@@ -3125,7 +3126,7 @@
         </p:nvSpPr>
         <p:spPr>
           <a:xfrm>
-            <a:off x="3780000" y="2520000"/>
+            <a:off x="4680000" y="2520000"/>
             <a:ext cx="0" cy="360000"/>
           </a:xfrm>
           <a:prstGeom prst="line">
@@ -3197,7 +3198,7 @@
         </p:nvSpPr>
         <p:spPr>
           <a:xfrm>
-            <a:off x="1980000" y="5220000"/>
+            <a:off x="3240000" y="5940000"/>
             <a:ext cx="0" cy="180000"/>
           </a:xfrm>
           <a:prstGeom prst="line">
@@ -3225,7 +3226,7 @@
         </p:nvSpPr>
         <p:spPr>
           <a:xfrm>
-            <a:off x="1980000" y="6300000"/>
+            <a:off x="3240000" y="7020000"/>
             <a:ext cx="0" cy="180000"/>
           </a:xfrm>
           <a:prstGeom prst="line">
@@ -3289,6 +3290,1446 @@
           </a:ln>
         </p:spPr>
       </p:cxnSp>
+      <p:sp>
+        <p:nvSpPr>
+          <p:cNvPr id="57" name=""/>
+          <p:cNvSpPr txBox="1"/>
+          <p:nvPr/>
+        </p:nvSpPr>
+        <p:spPr>
+          <a:xfrm>
+            <a:off x="-32040" y="13680"/>
+            <a:ext cx="2809800" cy="346320"/>
+          </a:xfrm>
+          <a:prstGeom prst="rect">
+            <a:avLst/>
+          </a:prstGeom>
+          <a:noFill/>
+          <a:ln w="0">
+            <a:noFill/>
+          </a:ln>
+        </p:spPr>
+        <p:txBody>
+          <a:bodyPr lIns="90000" rIns="90000" tIns="45000" bIns="45000" anchor="t">
+            <a:noAutofit/>
+          </a:bodyPr>
+          <a:p>
+            <a:r>
+              <a:rPr b="0" lang="fr-CH" sz="1800" spc="-1" strike="noStrike">
+                <a:latin typeface="Arial"/>
+              </a:rPr>
+              <a:t>Gdgtm test script sections</a:t>
+            </a:r>
+            <a:endParaRPr b="0" lang="fr-CH" sz="1800" spc="-1" strike="noStrike">
+              <a:latin typeface="Arial"/>
+            </a:endParaRPr>
+          </a:p>
+        </p:txBody>
+      </p:sp>
+      <p:sp>
+        <p:nvSpPr>
+          <p:cNvPr id="58" name=""/>
+          <p:cNvSpPr/>
+          <p:nvPr/>
+        </p:nvSpPr>
+        <p:spPr>
+          <a:xfrm>
+            <a:off x="1260000" y="720000"/>
+            <a:ext cx="0" cy="9000000"/>
+          </a:xfrm>
+          <a:prstGeom prst="line">
+            <a:avLst/>
+          </a:prstGeom>
+          <a:ln w="0">
+            <a:solidFill>
+              <a:srgbClr val="3465a4"/>
+            </a:solidFill>
+          </a:ln>
+        </p:spPr>
+        <p:style>
+          <a:lnRef idx="0"/>
+          <a:fillRef idx="0"/>
+          <a:effectRef idx="0"/>
+          <a:fontRef idx="minor"/>
+        </p:style>
+      </p:sp>
+      <p:sp>
+        <p:nvSpPr>
+          <p:cNvPr id="59" name=""/>
+          <p:cNvSpPr/>
+          <p:nvPr/>
+        </p:nvSpPr>
+        <p:spPr>
+          <a:xfrm rot="16200000">
+            <a:off x="-539640" y="4320000"/>
+            <a:ext cx="2520000" cy="720000"/>
+          </a:xfrm>
+          <a:prstGeom prst="rect">
+            <a:avLst/>
+          </a:prstGeom>
+          <a:solidFill>
+            <a:srgbClr val="729fcf"/>
+          </a:solidFill>
+          <a:ln w="0">
+            <a:solidFill>
+              <a:srgbClr val="3465a4"/>
+            </a:solidFill>
+          </a:ln>
+        </p:spPr>
+        <p:style>
+          <a:lnRef idx="0"/>
+          <a:fillRef idx="0"/>
+          <a:effectRef idx="0"/>
+          <a:fontRef idx="minor"/>
+        </p:style>
+        <p:txBody>
+          <a:bodyPr lIns="90000" rIns="90000" tIns="45000" bIns="45000" anchor="ctr">
+            <a:noAutofit/>
+          </a:bodyPr>
+          <a:p>
+            <a:pPr algn="ctr">
+              <a:buNone/>
+            </a:pPr>
+            <a:r>
+              <a:rPr b="0" lang="fr-CH" sz="1800" spc="-1" strike="noStrike">
+                <a:latin typeface="Arial"/>
+              </a:rPr>
+              <a:t>Automated execution</a:t>
+            </a:r>
+            <a:endParaRPr b="0" lang="fr-CH" sz="1800" spc="-1" strike="noStrike">
+              <a:latin typeface="Arial"/>
+            </a:endParaRPr>
+          </a:p>
+        </p:txBody>
+      </p:sp>
+      <p:sp>
+        <p:nvSpPr>
+          <p:cNvPr id="60" name=""/>
+          <p:cNvSpPr txBox="1"/>
+          <p:nvPr/>
+        </p:nvSpPr>
+        <p:spPr>
+          <a:xfrm>
+            <a:off x="3441240" y="4140000"/>
+            <a:ext cx="878760" cy="346320"/>
+          </a:xfrm>
+          <a:prstGeom prst="rect">
+            <a:avLst/>
+          </a:prstGeom>
+          <a:noFill/>
+          <a:ln w="0">
+            <a:noFill/>
+          </a:ln>
+        </p:spPr>
+        <p:txBody>
+          <a:bodyPr lIns="90000" rIns="90000" tIns="45000" bIns="45000" anchor="t">
+            <a:noAutofit/>
+          </a:bodyPr>
+          <a:p>
+            <a:r>
+              <a:rPr b="0" lang="fr-CH" sz="1800" spc="-1" strike="noStrike">
+                <a:latin typeface="Arial"/>
+              </a:rPr>
+              <a:t>Master</a:t>
+            </a:r>
+            <a:endParaRPr b="0" lang="fr-CH" sz="1800" spc="-1" strike="noStrike">
+              <a:latin typeface="Arial"/>
+            </a:endParaRPr>
+          </a:p>
+        </p:txBody>
+      </p:sp>
+      <p:sp>
+        <p:nvSpPr>
+          <p:cNvPr id="61" name=""/>
+          <p:cNvSpPr txBox="1"/>
+          <p:nvPr/>
+        </p:nvSpPr>
+        <p:spPr>
+          <a:xfrm>
+            <a:off x="4680000" y="5400000"/>
+            <a:ext cx="1713960" cy="346320"/>
+          </a:xfrm>
+          <a:prstGeom prst="rect">
+            <a:avLst/>
+          </a:prstGeom>
+          <a:noFill/>
+          <a:ln w="0">
+            <a:noFill/>
+          </a:ln>
+        </p:spPr>
+        <p:txBody>
+          <a:bodyPr lIns="90000" rIns="90000" tIns="45000" bIns="45000" anchor="t">
+            <a:noAutofit/>
+          </a:bodyPr>
+          <a:p>
+            <a:r>
+              <a:rPr b="0" lang="fr-CH" sz="1800" spc="-1" strike="noStrike">
+                <a:latin typeface="Arial"/>
+              </a:rPr>
+              <a:t>S</a:t>
+            </a:r>
+            <a:r>
+              <a:rPr b="0" lang="fr-CH" sz="1800" spc="-1" strike="noStrike">
+                <a:latin typeface="Arial"/>
+              </a:rPr>
+              <a:t>u</a:t>
+            </a:r>
+            <a:r>
+              <a:rPr b="0" lang="fr-CH" sz="1800" spc="-1" strike="noStrike">
+                <a:latin typeface="Arial"/>
+              </a:rPr>
+              <a:t>p</a:t>
+            </a:r>
+            <a:r>
+              <a:rPr b="0" lang="fr-CH" sz="1800" spc="-1" strike="noStrike">
+                <a:latin typeface="Arial"/>
+              </a:rPr>
+              <a:t>pl</a:t>
+            </a:r>
+            <a:r>
+              <a:rPr b="0" lang="fr-CH" sz="1800" spc="-1" strike="noStrike">
+                <a:latin typeface="Arial"/>
+              </a:rPr>
+              <a:t>e</a:t>
+            </a:r>
+            <a:r>
+              <a:rPr b="0" lang="fr-CH" sz="1800" spc="-1" strike="noStrike">
+                <a:latin typeface="Arial"/>
+              </a:rPr>
+              <a:t>m</a:t>
+            </a:r>
+            <a:r>
+              <a:rPr b="0" lang="fr-CH" sz="1800" spc="-1" strike="noStrike">
+                <a:latin typeface="Arial"/>
+              </a:rPr>
+              <a:t>e</a:t>
+            </a:r>
+            <a:r>
+              <a:rPr b="0" lang="fr-CH" sz="1800" spc="-1" strike="noStrike">
+                <a:latin typeface="Arial"/>
+              </a:rPr>
+              <a:t>n</a:t>
+            </a:r>
+            <a:r>
+              <a:rPr b="0" lang="fr-CH" sz="1800" spc="-1" strike="noStrike">
+                <a:latin typeface="Arial"/>
+              </a:rPr>
+              <a:t>t</a:t>
+            </a:r>
+            <a:r>
+              <a:rPr b="0" lang="fr-CH" sz="1800" spc="-1" strike="noStrike">
+                <a:latin typeface="Arial"/>
+              </a:rPr>
+              <a:t>a</a:t>
+            </a:r>
+            <a:r>
+              <a:rPr b="0" lang="fr-CH" sz="1800" spc="-1" strike="noStrike">
+                <a:latin typeface="Arial"/>
+              </a:rPr>
+              <a:t>r</a:t>
+            </a:r>
+            <a:r>
+              <a:rPr b="0" lang="fr-CH" sz="1800" spc="-1" strike="noStrike">
+                <a:latin typeface="Arial"/>
+              </a:rPr>
+              <a:t>y</a:t>
+            </a:r>
+            <a:endParaRPr b="0" lang="fr-CH" sz="1800" spc="-1" strike="noStrike">
+              <a:latin typeface="Arial"/>
+            </a:endParaRPr>
+          </a:p>
+        </p:txBody>
+      </p:sp>
+      <p:sp>
+        <p:nvSpPr>
+          <p:cNvPr id="62" name=""/>
+          <p:cNvSpPr/>
+          <p:nvPr/>
+        </p:nvSpPr>
+        <p:spPr>
+          <a:xfrm>
+            <a:off x="3054600" y="180000"/>
+            <a:ext cx="3240000" cy="1260000"/>
+          </a:xfrm>
+          <a:prstGeom prst="rect">
+            <a:avLst/>
+          </a:prstGeom>
+          <a:noFill/>
+          <a:ln w="0">
+            <a:solidFill>
+              <a:srgbClr val="ff8000"/>
+            </a:solidFill>
+          </a:ln>
+        </p:spPr>
+        <p:style>
+          <a:lnRef idx="0"/>
+          <a:fillRef idx="0"/>
+          <a:effectRef idx="0"/>
+          <a:fontRef idx="minor"/>
+        </p:style>
+      </p:sp>
+      <p:sp>
+        <p:nvSpPr>
+          <p:cNvPr id="63" name=""/>
+          <p:cNvSpPr/>
+          <p:nvPr/>
+        </p:nvSpPr>
+        <p:spPr>
+          <a:xfrm>
+            <a:off x="3054600" y="1440000"/>
+            <a:ext cx="3240000" cy="2520000"/>
+          </a:xfrm>
+          <a:prstGeom prst="rect">
+            <a:avLst/>
+          </a:prstGeom>
+          <a:noFill/>
+          <a:ln w="0">
+            <a:solidFill>
+              <a:srgbClr val="ff8000"/>
+            </a:solidFill>
+          </a:ln>
+        </p:spPr>
+        <p:style>
+          <a:lnRef idx="0"/>
+          <a:fillRef idx="0"/>
+          <a:effectRef idx="0"/>
+          <a:fontRef idx="minor"/>
+        </p:style>
+      </p:sp>
+      <p:sp>
+        <p:nvSpPr>
+          <p:cNvPr id="64" name=""/>
+          <p:cNvSpPr/>
+          <p:nvPr/>
+        </p:nvSpPr>
+        <p:spPr>
+          <a:xfrm>
+            <a:off x="1806840" y="4860000"/>
+            <a:ext cx="2881440" cy="3420000"/>
+          </a:xfrm>
+          <a:prstGeom prst="rect">
+            <a:avLst/>
+          </a:prstGeom>
+          <a:noFill/>
+          <a:ln w="0">
+            <a:solidFill>
+              <a:srgbClr val="ff8000"/>
+            </a:solidFill>
+          </a:ln>
+        </p:spPr>
+        <p:style>
+          <a:lnRef idx="0"/>
+          <a:fillRef idx="0"/>
+          <a:effectRef idx="0"/>
+          <a:fontRef idx="minor"/>
+        </p:style>
+      </p:sp>
+      <p:sp>
+        <p:nvSpPr>
+          <p:cNvPr id="65" name=""/>
+          <p:cNvSpPr/>
+          <p:nvPr/>
+        </p:nvSpPr>
+        <p:spPr>
+          <a:xfrm>
+            <a:off x="4693680" y="7380000"/>
+            <a:ext cx="2686320" cy="1440000"/>
+          </a:xfrm>
+          <a:prstGeom prst="rect">
+            <a:avLst/>
+          </a:prstGeom>
+          <a:noFill/>
+          <a:ln w="0">
+            <a:solidFill>
+              <a:srgbClr val="ff8000"/>
+            </a:solidFill>
+          </a:ln>
+        </p:spPr>
+        <p:style>
+          <a:lnRef idx="0"/>
+          <a:fillRef idx="0"/>
+          <a:effectRef idx="0"/>
+          <a:fontRef idx="minor"/>
+        </p:style>
+      </p:sp>
+      <p:sp>
+        <p:nvSpPr>
+          <p:cNvPr id="66" name=""/>
+          <p:cNvSpPr/>
+          <p:nvPr/>
+        </p:nvSpPr>
+        <p:spPr>
+          <a:xfrm>
+            <a:off x="174600" y="3060000"/>
+            <a:ext cx="1080000" cy="3240000"/>
+          </a:xfrm>
+          <a:prstGeom prst="rect">
+            <a:avLst/>
+          </a:prstGeom>
+          <a:noFill/>
+          <a:ln w="0">
+            <a:solidFill>
+              <a:srgbClr val="ff8000"/>
+            </a:solidFill>
+          </a:ln>
+        </p:spPr>
+        <p:style>
+          <a:lnRef idx="0"/>
+          <a:fillRef idx="0"/>
+          <a:effectRef idx="0"/>
+          <a:fontRef idx="minor"/>
+        </p:style>
+      </p:sp>
+      <p:sp>
+        <p:nvSpPr>
+          <p:cNvPr id="67" name=""/>
+          <p:cNvSpPr/>
+          <p:nvPr/>
+        </p:nvSpPr>
+        <p:spPr>
+          <a:xfrm>
+            <a:off x="3062520" y="8820000"/>
+            <a:ext cx="2874600" cy="1080000"/>
+          </a:xfrm>
+          <a:prstGeom prst="rect">
+            <a:avLst/>
+          </a:prstGeom>
+          <a:noFill/>
+          <a:ln w="0">
+            <a:solidFill>
+              <a:srgbClr val="ff8000"/>
+            </a:solidFill>
+          </a:ln>
+        </p:spPr>
+        <p:style>
+          <a:lnRef idx="0"/>
+          <a:fillRef idx="0"/>
+          <a:effectRef idx="0"/>
+          <a:fontRef idx="minor"/>
+        </p:style>
+      </p:sp>
+      <p:sp>
+        <p:nvSpPr>
+          <p:cNvPr id="68" name=""/>
+          <p:cNvSpPr txBox="1"/>
+          <p:nvPr/>
+        </p:nvSpPr>
+        <p:spPr>
+          <a:xfrm rot="5400000">
+            <a:off x="5901840" y="700920"/>
+            <a:ext cx="1131840" cy="346320"/>
+          </a:xfrm>
+          <a:prstGeom prst="rect">
+            <a:avLst/>
+          </a:prstGeom>
+          <a:noFill/>
+          <a:ln w="0">
+            <a:noFill/>
+          </a:ln>
+        </p:spPr>
+        <p:txBody>
+          <a:bodyPr lIns="90000" rIns="90000" tIns="45000" bIns="45000" anchor="t">
+            <a:noAutofit/>
+          </a:bodyPr>
+          <a:p>
+            <a:r>
+              <a:rPr b="0" lang="fr-CH" sz="1800" spc="-1" strike="noStrike">
+                <a:latin typeface="Arial"/>
+              </a:rPr>
+              <a:t>Section 1</a:t>
+            </a:r>
+            <a:endParaRPr b="0" lang="fr-CH" sz="1800" spc="-1" strike="noStrike">
+              <a:latin typeface="Arial"/>
+            </a:endParaRPr>
+          </a:p>
+        </p:txBody>
+      </p:sp>
+      <p:sp>
+        <p:nvSpPr>
+          <p:cNvPr id="69" name=""/>
+          <p:cNvSpPr txBox="1"/>
+          <p:nvPr/>
+        </p:nvSpPr>
+        <p:spPr>
+          <a:xfrm rot="5400000">
+            <a:off x="5901840" y="2372760"/>
+            <a:ext cx="1131840" cy="346320"/>
+          </a:xfrm>
+          <a:prstGeom prst="rect">
+            <a:avLst/>
+          </a:prstGeom>
+          <a:noFill/>
+          <a:ln w="0">
+            <a:noFill/>
+          </a:ln>
+        </p:spPr>
+        <p:txBody>
+          <a:bodyPr lIns="90000" rIns="90000" tIns="45000" bIns="45000" anchor="t">
+            <a:noAutofit/>
+          </a:bodyPr>
+          <a:p>
+            <a:r>
+              <a:rPr b="0" lang="fr-CH" sz="1800" spc="-1" strike="noStrike">
+                <a:latin typeface="Arial"/>
+              </a:rPr>
+              <a:t>Section 3</a:t>
+            </a:r>
+            <a:endParaRPr b="0" lang="fr-CH" sz="1800" spc="-1" strike="noStrike">
+              <a:latin typeface="Arial"/>
+            </a:endParaRPr>
+          </a:p>
+        </p:txBody>
+      </p:sp>
+      <p:sp>
+        <p:nvSpPr>
+          <p:cNvPr id="70" name=""/>
+          <p:cNvSpPr txBox="1"/>
+          <p:nvPr/>
+        </p:nvSpPr>
+        <p:spPr>
+          <a:xfrm>
+            <a:off x="1800000" y="4513680"/>
+            <a:ext cx="1131840" cy="346320"/>
+          </a:xfrm>
+          <a:prstGeom prst="rect">
+            <a:avLst/>
+          </a:prstGeom>
+          <a:noFill/>
+          <a:ln w="0">
+            <a:noFill/>
+          </a:ln>
+        </p:spPr>
+        <p:txBody>
+          <a:bodyPr lIns="90000" rIns="90000" tIns="45000" bIns="45000" anchor="t">
+            <a:noAutofit/>
+          </a:bodyPr>
+          <a:p>
+            <a:r>
+              <a:rPr b="0" lang="fr-CH" sz="1800" spc="-1" strike="noStrike">
+                <a:latin typeface="Arial"/>
+              </a:rPr>
+              <a:t>Section 2</a:t>
+            </a:r>
+            <a:endParaRPr b="0" lang="fr-CH" sz="1800" spc="-1" strike="noStrike">
+              <a:latin typeface="Arial"/>
+            </a:endParaRPr>
+          </a:p>
+        </p:txBody>
+      </p:sp>
+      <p:sp>
+        <p:nvSpPr>
+          <p:cNvPr id="71" name=""/>
+          <p:cNvSpPr txBox="1"/>
+          <p:nvPr/>
+        </p:nvSpPr>
+        <p:spPr>
+          <a:xfrm>
+            <a:off x="6120000" y="7033680"/>
+            <a:ext cx="1131840" cy="346320"/>
+          </a:xfrm>
+          <a:prstGeom prst="rect">
+            <a:avLst/>
+          </a:prstGeom>
+          <a:noFill/>
+          <a:ln w="0">
+            <a:noFill/>
+          </a:ln>
+        </p:spPr>
+        <p:txBody>
+          <a:bodyPr lIns="90000" rIns="90000" tIns="45000" bIns="45000" anchor="t">
+            <a:noAutofit/>
+          </a:bodyPr>
+          <a:p>
+            <a:r>
+              <a:rPr b="0" lang="fr-CH" sz="1800" spc="-1" strike="noStrike">
+                <a:latin typeface="Arial"/>
+              </a:rPr>
+              <a:t>Section 4</a:t>
+            </a:r>
+            <a:endParaRPr b="0" lang="fr-CH" sz="1800" spc="-1" strike="noStrike">
+              <a:latin typeface="Arial"/>
+            </a:endParaRPr>
+          </a:p>
+        </p:txBody>
+      </p:sp>
+      <p:sp>
+        <p:nvSpPr>
+          <p:cNvPr id="72" name=""/>
+          <p:cNvSpPr txBox="1"/>
+          <p:nvPr/>
+        </p:nvSpPr>
+        <p:spPr>
+          <a:xfrm rot="16200000">
+            <a:off x="2307240" y="9160920"/>
+            <a:ext cx="1131840" cy="346320"/>
+          </a:xfrm>
+          <a:prstGeom prst="rect">
+            <a:avLst/>
+          </a:prstGeom>
+          <a:noFill/>
+          <a:ln w="0">
+            <a:noFill/>
+          </a:ln>
+        </p:spPr>
+        <p:txBody>
+          <a:bodyPr lIns="90000" rIns="90000" tIns="45000" bIns="45000" anchor="t">
+            <a:noAutofit/>
+          </a:bodyPr>
+          <a:p>
+            <a:r>
+              <a:rPr b="0" lang="fr-CH" sz="1800" spc="-1" strike="noStrike">
+                <a:latin typeface="Arial"/>
+              </a:rPr>
+              <a:t>Section 5</a:t>
+            </a:r>
+            <a:endParaRPr b="0" lang="fr-CH" sz="1800" spc="-1" strike="noStrike">
+              <a:latin typeface="Arial"/>
+            </a:endParaRPr>
+          </a:p>
+        </p:txBody>
+      </p:sp>
+      <p:sp>
+        <p:nvSpPr>
+          <p:cNvPr id="73" name=""/>
+          <p:cNvSpPr txBox="1"/>
+          <p:nvPr/>
+        </p:nvSpPr>
+        <p:spPr>
+          <a:xfrm>
+            <a:off x="180000" y="2700000"/>
+            <a:ext cx="1131840" cy="360000"/>
+          </a:xfrm>
+          <a:prstGeom prst="rect">
+            <a:avLst/>
+          </a:prstGeom>
+          <a:noFill/>
+          <a:ln w="0">
+            <a:noFill/>
+          </a:ln>
+        </p:spPr>
+        <p:txBody>
+          <a:bodyPr lIns="90000" rIns="90000" tIns="45000" bIns="45000" anchor="t">
+            <a:noAutofit/>
+          </a:bodyPr>
+          <a:p>
+            <a:r>
+              <a:rPr b="0" lang="fr-CH" sz="1800" spc="-1" strike="noStrike">
+                <a:latin typeface="Arial"/>
+              </a:rPr>
+              <a:t>Section 6</a:t>
+            </a:r>
+            <a:endParaRPr b="0" lang="fr-CH" sz="1800" spc="-1" strike="noStrike">
+              <a:latin typeface="Arial"/>
+            </a:endParaRPr>
+          </a:p>
+        </p:txBody>
+      </p:sp>
+    </p:spTree>
+  </p:cSld>
+  <mc:AlternateContent>
+    <mc:Choice Requires="p14">
+      <p:transition spd="slow" p14:dur="2000"/>
+    </mc:Choice>
+    <mc:Fallback>
+      <p:transition spd="slow"/>
+    </mc:Fallback>
+  </mc:AlternateContent>
+</p:sld>
+</file>
+
+<file path=ppt/slides/slide2.xml><?xml version="1.0" encoding="utf-8"?>
+<p:sld xmlns:a="http://schemas.openxmlformats.org/drawingml/2006/main" xmlns:p="http://schemas.openxmlformats.org/presentationml/2006/main" xmlns:r="http://schemas.openxmlformats.org/officeDocument/2006/relationships" xmlns:p14="http://schemas.microsoft.com/office/powerpoint/2010/main" xmlns:p15="http://schemas.microsoft.com/office/powerpoint/2012/main" xmlns:mc="http://schemas.openxmlformats.org/markup-compatibility/2006">
+  <p:cSld>
+    <p:spTree>
+      <p:nvGrpSpPr>
+        <p:cNvPr id="1" name=""/>
+        <p:cNvGrpSpPr/>
+        <p:nvPr/>
+      </p:nvGrpSpPr>
+      <p:grpSpPr>
+        <a:xfrm>
+          <a:off x="0" y="0"/>
+          <a:ext cx="0" cy="0"/>
+          <a:chOff x="0" y="0"/>
+          <a:chExt cx="0" cy="0"/>
+        </a:xfrm>
+      </p:grpSpPr>
+      <p:sp>
+        <p:nvSpPr>
+          <p:cNvPr id="74" name=""/>
+          <p:cNvSpPr/>
+          <p:nvPr/>
+        </p:nvSpPr>
+        <p:spPr>
+          <a:xfrm>
+            <a:off x="3420000" y="1620000"/>
+            <a:ext cx="2520000" cy="900000"/>
+          </a:xfrm>
+          <a:prstGeom prst="rect">
+            <a:avLst/>
+          </a:prstGeom>
+          <a:solidFill>
+            <a:srgbClr val="729fcf"/>
+          </a:solidFill>
+          <a:ln w="0">
+            <a:solidFill>
+              <a:srgbClr val="3465a4"/>
+            </a:solidFill>
+          </a:ln>
+        </p:spPr>
+        <p:style>
+          <a:lnRef idx="0"/>
+          <a:fillRef idx="0"/>
+          <a:effectRef idx="0"/>
+          <a:fontRef idx="minor"/>
+        </p:style>
+        <p:txBody>
+          <a:bodyPr lIns="90000" rIns="90000" tIns="45000" bIns="45000" anchor="ctr">
+            <a:noAutofit/>
+          </a:bodyPr>
+          <a:p>
+            <a:pPr algn="ctr">
+              <a:buNone/>
+            </a:pPr>
+            <a:r>
+              <a:rPr b="0" lang="fr-CH" sz="1800" spc="-1" strike="noStrike">
+                <a:latin typeface="Arial"/>
+              </a:rPr>
+              <a:t>Mosaicing</a:t>
+            </a:r>
+            <a:endParaRPr b="0" lang="fr-CH" sz="1800" spc="-1" strike="noStrike">
+              <a:latin typeface="Arial"/>
+            </a:endParaRPr>
+          </a:p>
+        </p:txBody>
+      </p:sp>
+      <p:sp>
+        <p:nvSpPr>
+          <p:cNvPr id="75" name=""/>
+          <p:cNvSpPr/>
+          <p:nvPr/>
+        </p:nvSpPr>
+        <p:spPr>
+          <a:xfrm>
+            <a:off x="1980000" y="5040000"/>
+            <a:ext cx="2520000" cy="900000"/>
+          </a:xfrm>
+          <a:prstGeom prst="rect">
+            <a:avLst/>
+          </a:prstGeom>
+          <a:solidFill>
+            <a:srgbClr val="729fcf"/>
+          </a:solidFill>
+          <a:ln w="0">
+            <a:solidFill>
+              <a:srgbClr val="3465a4"/>
+            </a:solidFill>
+          </a:ln>
+        </p:spPr>
+        <p:style>
+          <a:lnRef idx="0"/>
+          <a:fillRef idx="0"/>
+          <a:effectRef idx="0"/>
+          <a:fontRef idx="minor"/>
+        </p:style>
+        <p:txBody>
+          <a:bodyPr lIns="90000" rIns="90000" tIns="45000" bIns="45000" anchor="ctr">
+            <a:noAutofit/>
+          </a:bodyPr>
+          <a:p>
+            <a:pPr algn="ctr">
+              <a:buNone/>
+            </a:pPr>
+            <a:r>
+              <a:rPr b="0" lang="fr-CH" sz="1800" spc="-1" strike="noStrike">
+                <a:latin typeface="Arial"/>
+              </a:rPr>
+              <a:t>Re-project</a:t>
+            </a:r>
+            <a:endParaRPr b="0" lang="fr-CH" sz="1800" spc="-1" strike="noStrike">
+              <a:latin typeface="Arial"/>
+            </a:endParaRPr>
+          </a:p>
+        </p:txBody>
+      </p:sp>
+      <p:sp>
+        <p:nvSpPr>
+          <p:cNvPr id="76" name=""/>
+          <p:cNvSpPr/>
+          <p:nvPr/>
+        </p:nvSpPr>
+        <p:spPr>
+          <a:xfrm>
+            <a:off x="3420000" y="360000"/>
+            <a:ext cx="2520000" cy="900000"/>
+          </a:xfrm>
+          <a:prstGeom prst="rect">
+            <a:avLst/>
+          </a:prstGeom>
+          <a:solidFill>
+            <a:srgbClr val="729fcf"/>
+          </a:solidFill>
+          <a:ln w="0">
+            <a:solidFill>
+              <a:srgbClr val="3465a4"/>
+            </a:solidFill>
+          </a:ln>
+        </p:spPr>
+        <p:style>
+          <a:lnRef idx="0"/>
+          <a:fillRef idx="0"/>
+          <a:effectRef idx="0"/>
+          <a:fontRef idx="minor"/>
+        </p:style>
+        <p:txBody>
+          <a:bodyPr lIns="90000" rIns="90000" tIns="45000" bIns="45000" anchor="ctr">
+            <a:noAutofit/>
+          </a:bodyPr>
+          <a:p>
+            <a:pPr algn="ctr">
+              <a:buNone/>
+            </a:pPr>
+            <a:r>
+              <a:rPr b="0" lang="fr-CH" sz="1800" spc="-1" strike="noStrike">
+                <a:latin typeface="Arial"/>
+              </a:rPr>
+              <a:t>Get source geotiffs</a:t>
+            </a:r>
+            <a:endParaRPr b="0" lang="fr-CH" sz="1800" spc="-1" strike="noStrike">
+              <a:latin typeface="Arial"/>
+            </a:endParaRPr>
+          </a:p>
+        </p:txBody>
+      </p:sp>
+      <p:sp>
+        <p:nvSpPr>
+          <p:cNvPr id="77" name=""/>
+          <p:cNvSpPr/>
+          <p:nvPr/>
+        </p:nvSpPr>
+        <p:spPr>
+          <a:xfrm>
+            <a:off x="3420000" y="2880000"/>
+            <a:ext cx="2520000" cy="900000"/>
+          </a:xfrm>
+          <a:prstGeom prst="rect">
+            <a:avLst/>
+          </a:prstGeom>
+          <a:solidFill>
+            <a:srgbClr val="729fcf"/>
+          </a:solidFill>
+          <a:ln w="0">
+            <a:solidFill>
+              <a:srgbClr val="3465a4"/>
+            </a:solidFill>
+          </a:ln>
+        </p:spPr>
+        <p:style>
+          <a:lnRef idx="0"/>
+          <a:fillRef idx="0"/>
+          <a:effectRef idx="0"/>
+          <a:fontRef idx="minor"/>
+        </p:style>
+        <p:txBody>
+          <a:bodyPr lIns="90000" rIns="90000" tIns="45000" bIns="45000" anchor="ctr">
+            <a:noAutofit/>
+          </a:bodyPr>
+          <a:p>
+            <a:pPr algn="ctr">
+              <a:buNone/>
+            </a:pPr>
+            <a:r>
+              <a:rPr b="0" lang="fr-CH" sz="1800" spc="-1" strike="noStrike">
+                <a:latin typeface="Arial"/>
+              </a:rPr>
+              <a:t>Layering</a:t>
+            </a:r>
+            <a:endParaRPr b="0" lang="fr-CH" sz="1800" spc="-1" strike="noStrike">
+              <a:latin typeface="Arial"/>
+            </a:endParaRPr>
+          </a:p>
+        </p:txBody>
+      </p:sp>
+      <p:sp>
+        <p:nvSpPr>
+          <p:cNvPr id="78" name=""/>
+          <p:cNvSpPr/>
+          <p:nvPr/>
+        </p:nvSpPr>
+        <p:spPr>
+          <a:xfrm>
+            <a:off x="1980000" y="6120000"/>
+            <a:ext cx="2520000" cy="900000"/>
+          </a:xfrm>
+          <a:prstGeom prst="rect">
+            <a:avLst/>
+          </a:prstGeom>
+          <a:solidFill>
+            <a:srgbClr val="729fcf"/>
+          </a:solidFill>
+          <a:ln w="0">
+            <a:solidFill>
+              <a:srgbClr val="3465a4"/>
+            </a:solidFill>
+          </a:ln>
+        </p:spPr>
+        <p:style>
+          <a:lnRef idx="0"/>
+          <a:fillRef idx="0"/>
+          <a:effectRef idx="0"/>
+          <a:fontRef idx="minor"/>
+        </p:style>
+        <p:txBody>
+          <a:bodyPr lIns="90000" rIns="90000" tIns="45000" bIns="45000" anchor="ctr">
+            <a:noAutofit/>
+          </a:bodyPr>
+          <a:p>
+            <a:pPr algn="ctr">
+              <a:buNone/>
+            </a:pPr>
+            <a:r>
+              <a:rPr b="0" lang="fr-CH" sz="1800" spc="-1" strike="noStrike">
+                <a:latin typeface="Arial"/>
+              </a:rPr>
+              <a:t>Change resolution</a:t>
+            </a:r>
+            <a:endParaRPr b="0" lang="fr-CH" sz="1800" spc="-1" strike="noStrike">
+              <a:latin typeface="Arial"/>
+            </a:endParaRPr>
+          </a:p>
+        </p:txBody>
+      </p:sp>
+      <p:sp>
+        <p:nvSpPr>
+          <p:cNvPr id="79" name=""/>
+          <p:cNvSpPr/>
+          <p:nvPr/>
+        </p:nvSpPr>
+        <p:spPr>
+          <a:xfrm>
+            <a:off x="1980000" y="7200000"/>
+            <a:ext cx="2520000" cy="900000"/>
+          </a:xfrm>
+          <a:prstGeom prst="rect">
+            <a:avLst/>
+          </a:prstGeom>
+          <a:solidFill>
+            <a:srgbClr val="729fcf"/>
+          </a:solidFill>
+          <a:ln w="0">
+            <a:solidFill>
+              <a:srgbClr val="3465a4"/>
+            </a:solidFill>
+          </a:ln>
+        </p:spPr>
+        <p:style>
+          <a:lnRef idx="0"/>
+          <a:fillRef idx="0"/>
+          <a:effectRef idx="0"/>
+          <a:fontRef idx="minor"/>
+        </p:style>
+        <p:txBody>
+          <a:bodyPr lIns="90000" rIns="90000" tIns="45000" bIns="45000" anchor="ctr">
+            <a:noAutofit/>
+          </a:bodyPr>
+          <a:p>
+            <a:pPr algn="ctr">
+              <a:buNone/>
+            </a:pPr>
+            <a:r>
+              <a:rPr b="0" lang="fr-CH" sz="1800" spc="-1" strike="noStrike">
+                <a:latin typeface="Arial"/>
+              </a:rPr>
+              <a:t>New bounding box</a:t>
+            </a:r>
+            <a:endParaRPr b="0" lang="fr-CH" sz="1800" spc="-1" strike="noStrike">
+              <a:latin typeface="Arial"/>
+            </a:endParaRPr>
+          </a:p>
+        </p:txBody>
+      </p:sp>
+      <p:sp>
+        <p:nvSpPr>
+          <p:cNvPr id="80" name=""/>
+          <p:cNvSpPr/>
+          <p:nvPr/>
+        </p:nvSpPr>
+        <p:spPr>
+          <a:xfrm>
+            <a:off x="4860000" y="7560000"/>
+            <a:ext cx="2520000" cy="900000"/>
+          </a:xfrm>
+          <a:prstGeom prst="rect">
+            <a:avLst/>
+          </a:prstGeom>
+          <a:solidFill>
+            <a:srgbClr val="729fcf"/>
+          </a:solidFill>
+          <a:ln w="0">
+            <a:solidFill>
+              <a:srgbClr val="3465a4"/>
+            </a:solidFill>
+          </a:ln>
+        </p:spPr>
+        <p:style>
+          <a:lnRef idx="0"/>
+          <a:fillRef idx="0"/>
+          <a:effectRef idx="0"/>
+          <a:fontRef idx="minor"/>
+        </p:style>
+        <p:txBody>
+          <a:bodyPr lIns="90000" rIns="90000" tIns="45000" bIns="45000" anchor="ctr">
+            <a:noAutofit/>
+          </a:bodyPr>
+          <a:p>
+            <a:pPr algn="ctr">
+              <a:buNone/>
+            </a:pPr>
+            <a:r>
+              <a:rPr b="0" lang="fr-CH" sz="1800" spc="-1" strike="noStrike">
+                <a:latin typeface="Arial"/>
+              </a:rPr>
+              <a:t>Standardize to master</a:t>
+            </a:r>
+            <a:endParaRPr b="0" lang="fr-CH" sz="1800" spc="-1" strike="noStrike">
+              <a:latin typeface="Arial"/>
+            </a:endParaRPr>
+          </a:p>
+        </p:txBody>
+      </p:sp>
+      <p:sp>
+        <p:nvSpPr>
+          <p:cNvPr id="81" name=""/>
+          <p:cNvSpPr/>
+          <p:nvPr/>
+        </p:nvSpPr>
+        <p:spPr>
+          <a:xfrm>
+            <a:off x="3240000" y="9000000"/>
+            <a:ext cx="2520000" cy="900000"/>
+          </a:xfrm>
+          <a:prstGeom prst="rect">
+            <a:avLst/>
+          </a:prstGeom>
+          <a:solidFill>
+            <a:srgbClr val="729fcf"/>
+          </a:solidFill>
+          <a:ln w="0">
+            <a:solidFill>
+              <a:srgbClr val="3465a4"/>
+            </a:solidFill>
+          </a:ln>
+        </p:spPr>
+        <p:style>
+          <a:lnRef idx="0"/>
+          <a:fillRef idx="0"/>
+          <a:effectRef idx="0"/>
+          <a:fontRef idx="minor"/>
+        </p:style>
+        <p:txBody>
+          <a:bodyPr lIns="90000" rIns="90000" tIns="45000" bIns="45000" anchor="ctr">
+            <a:noAutofit/>
+          </a:bodyPr>
+          <a:p>
+            <a:pPr algn="ctr">
+              <a:buNone/>
+            </a:pPr>
+            <a:r>
+              <a:rPr b="0" lang="fr-CH" sz="1800" spc="-1" strike="noStrike">
+                <a:latin typeface="Arial"/>
+              </a:rPr>
+              <a:t>Validate fit</a:t>
+            </a:r>
+            <a:endParaRPr b="0" lang="fr-CH" sz="1800" spc="-1" strike="noStrike">
+              <a:latin typeface="Arial"/>
+            </a:endParaRPr>
+          </a:p>
+        </p:txBody>
+      </p:sp>
+      <p:sp>
+        <p:nvSpPr>
+          <p:cNvPr id="82" name=""/>
+          <p:cNvSpPr/>
+          <p:nvPr/>
+        </p:nvSpPr>
+        <p:spPr>
+          <a:xfrm>
+            <a:off x="4680000" y="1260000"/>
+            <a:ext cx="0" cy="360000"/>
+          </a:xfrm>
+          <a:prstGeom prst="line">
+            <a:avLst/>
+          </a:prstGeom>
+          <a:ln w="0">
+            <a:solidFill>
+              <a:srgbClr val="3465a4"/>
+            </a:solidFill>
+            <a:tailEnd len="med" type="triangle" w="med"/>
+          </a:ln>
+        </p:spPr>
+        <p:style>
+          <a:lnRef idx="0"/>
+          <a:fillRef idx="0"/>
+          <a:effectRef idx="0"/>
+          <a:fontRef idx="minor"/>
+        </p:style>
+      </p:sp>
+      <p:sp>
+        <p:nvSpPr>
+          <p:cNvPr id="83" name=""/>
+          <p:cNvSpPr/>
+          <p:nvPr/>
+        </p:nvSpPr>
+        <p:spPr>
+          <a:xfrm>
+            <a:off x="4680000" y="2520000"/>
+            <a:ext cx="0" cy="360000"/>
+          </a:xfrm>
+          <a:prstGeom prst="line">
+            <a:avLst/>
+          </a:prstGeom>
+          <a:ln w="0">
+            <a:solidFill>
+              <a:srgbClr val="3465a4"/>
+            </a:solidFill>
+            <a:tailEnd len="med" type="triangle" w="med"/>
+          </a:ln>
+        </p:spPr>
+        <p:style>
+          <a:lnRef idx="0"/>
+          <a:fillRef idx="0"/>
+          <a:effectRef idx="0"/>
+          <a:fontRef idx="minor"/>
+        </p:style>
+      </p:sp>
+      <p:cxnSp>
+        <p:nvCxnSpPr>
+          <p:cNvPr id="84" name=""/>
+          <p:cNvCxnSpPr/>
+          <p:nvPr/>
+        </p:nvCxnSpPr>
+        <p:spPr>
+          <a:xfrm>
+            <a:off x="0" y="0"/>
+            <a:ext cx="360" cy="360"/>
+          </a:xfrm>
+          <a:prstGeom prst="line">
+            <a:avLst/>
+          </a:prstGeom>
+          <a:ln w="0">
+            <a:solidFill>
+              <a:srgbClr val="3465a4"/>
+            </a:solidFill>
+            <a:tailEnd len="med" type="triangle" w="med"/>
+          </a:ln>
+        </p:spPr>
+      </p:cxnSp>
+      <p:cxnSp>
+        <p:nvCxnSpPr>
+          <p:cNvPr id="85" name=""/>
+          <p:cNvCxnSpPr/>
+          <p:nvPr/>
+        </p:nvCxnSpPr>
+        <p:spPr>
+          <a:xfrm>
+            <a:off x="0" y="0"/>
+            <a:ext cx="360" cy="360"/>
+          </a:xfrm>
+          <a:prstGeom prst="line">
+            <a:avLst/>
+          </a:prstGeom>
+          <a:ln w="0">
+            <a:solidFill>
+              <a:srgbClr val="3465a4"/>
+            </a:solidFill>
+            <a:tailEnd len="med" type="triangle" w="med"/>
+          </a:ln>
+        </p:spPr>
+      </p:cxnSp>
+      <p:sp>
+        <p:nvSpPr>
+          <p:cNvPr id="86" name=""/>
+          <p:cNvSpPr/>
+          <p:nvPr/>
+        </p:nvSpPr>
+        <p:spPr>
+          <a:xfrm>
+            <a:off x="3240000" y="5940000"/>
+            <a:ext cx="0" cy="180000"/>
+          </a:xfrm>
+          <a:prstGeom prst="line">
+            <a:avLst/>
+          </a:prstGeom>
+          <a:ln w="0">
+            <a:solidFill>
+              <a:srgbClr val="3465a4"/>
+            </a:solidFill>
+            <a:tailEnd len="med" type="triangle" w="med"/>
+          </a:ln>
+        </p:spPr>
+        <p:style>
+          <a:lnRef idx="0"/>
+          <a:fillRef idx="0"/>
+          <a:effectRef idx="0"/>
+          <a:fontRef idx="minor"/>
+        </p:style>
+      </p:sp>
+      <p:sp>
+        <p:nvSpPr>
+          <p:cNvPr id="87" name=""/>
+          <p:cNvSpPr/>
+          <p:nvPr/>
+        </p:nvSpPr>
+        <p:spPr>
+          <a:xfrm>
+            <a:off x="3240000" y="7020000"/>
+            <a:ext cx="0" cy="180000"/>
+          </a:xfrm>
+          <a:prstGeom prst="line">
+            <a:avLst/>
+          </a:prstGeom>
+          <a:ln w="0">
+            <a:solidFill>
+              <a:srgbClr val="3465a4"/>
+            </a:solidFill>
+            <a:tailEnd len="med" type="triangle" w="med"/>
+          </a:ln>
+        </p:spPr>
+        <p:style>
+          <a:lnRef idx="0"/>
+          <a:fillRef idx="0"/>
+          <a:effectRef idx="0"/>
+          <a:fontRef idx="minor"/>
+        </p:style>
+      </p:sp>
+      <p:cxnSp>
+        <p:nvCxnSpPr>
+          <p:cNvPr id="88" name=""/>
+          <p:cNvCxnSpPr/>
+          <p:nvPr/>
+        </p:nvCxnSpPr>
+        <p:spPr>
+          <a:xfrm>
+            <a:off x="0" y="0"/>
+            <a:ext cx="360" cy="360"/>
+          </a:xfrm>
+          <a:prstGeom prst="line">
+            <a:avLst/>
+          </a:prstGeom>
+          <a:ln w="0">
+            <a:solidFill>
+              <a:srgbClr val="3465a4"/>
+            </a:solidFill>
+            <a:tailEnd len="med" type="triangle" w="med"/>
+          </a:ln>
+        </p:spPr>
+      </p:cxnSp>
+      <p:cxnSp>
+        <p:nvCxnSpPr>
+          <p:cNvPr id="89" name=""/>
+          <p:cNvCxnSpPr/>
+          <p:nvPr/>
+        </p:nvCxnSpPr>
+        <p:spPr>
+          <a:xfrm>
+            <a:off x="0" y="0"/>
+            <a:ext cx="360" cy="360"/>
+          </a:xfrm>
+          <a:prstGeom prst="line">
+            <a:avLst/>
+          </a:prstGeom>
+          <a:ln w="0">
+            <a:solidFill>
+              <a:srgbClr val="3465a4"/>
+            </a:solidFill>
+            <a:tailEnd len="med" type="triangle" w="med"/>
+          </a:ln>
+        </p:spPr>
+      </p:cxnSp>
+      <p:sp>
+        <p:nvSpPr>
+          <p:cNvPr id="90" name=""/>
+          <p:cNvSpPr txBox="1"/>
+          <p:nvPr/>
+        </p:nvSpPr>
+        <p:spPr>
+          <a:xfrm>
+            <a:off x="-32040" y="13680"/>
+            <a:ext cx="2552040" cy="346320"/>
+          </a:xfrm>
+          <a:prstGeom prst="rect">
+            <a:avLst/>
+          </a:prstGeom>
+          <a:noFill/>
+          <a:ln w="0">
+            <a:noFill/>
+          </a:ln>
+        </p:spPr>
+        <p:txBody>
+          <a:bodyPr lIns="90000" rIns="90000" tIns="45000" bIns="45000" anchor="t">
+            <a:noAutofit/>
+          </a:bodyPr>
+          <a:p>
+            <a:r>
+              <a:rPr b="0" lang="fr-CH" sz="1800" spc="-1" strike="noStrike">
+                <a:latin typeface="Arial"/>
+              </a:rPr>
+              <a:t>Overall gdgtm workflow</a:t>
+            </a:r>
+            <a:endParaRPr b="0" lang="fr-CH" sz="1800" spc="-1" strike="noStrike">
+              <a:latin typeface="Arial"/>
+            </a:endParaRPr>
+          </a:p>
+        </p:txBody>
+      </p:sp>
+      <p:sp>
+        <p:nvSpPr>
+          <p:cNvPr id="91" name=""/>
+          <p:cNvSpPr/>
+          <p:nvPr/>
+        </p:nvSpPr>
+        <p:spPr>
+          <a:xfrm>
+            <a:off x="1260000" y="720000"/>
+            <a:ext cx="0" cy="9000000"/>
+          </a:xfrm>
+          <a:prstGeom prst="line">
+            <a:avLst/>
+          </a:prstGeom>
+          <a:ln w="0">
+            <a:solidFill>
+              <a:srgbClr val="3465a4"/>
+            </a:solidFill>
+          </a:ln>
+        </p:spPr>
+        <p:style>
+          <a:lnRef idx="0"/>
+          <a:fillRef idx="0"/>
+          <a:effectRef idx="0"/>
+          <a:fontRef idx="minor"/>
+        </p:style>
+      </p:sp>
+      <p:sp>
+        <p:nvSpPr>
+          <p:cNvPr id="92" name=""/>
+          <p:cNvSpPr/>
+          <p:nvPr/>
+        </p:nvSpPr>
+        <p:spPr>
+          <a:xfrm rot="16200000">
+            <a:off x="-539640" y="4320000"/>
+            <a:ext cx="2520000" cy="720000"/>
+          </a:xfrm>
+          <a:prstGeom prst="rect">
+            <a:avLst/>
+          </a:prstGeom>
+          <a:solidFill>
+            <a:srgbClr val="729fcf"/>
+          </a:solidFill>
+          <a:ln w="0">
+            <a:solidFill>
+              <a:srgbClr val="3465a4"/>
+            </a:solidFill>
+          </a:ln>
+        </p:spPr>
+        <p:style>
+          <a:lnRef idx="0"/>
+          <a:fillRef idx="0"/>
+          <a:effectRef idx="0"/>
+          <a:fontRef idx="minor"/>
+        </p:style>
+        <p:txBody>
+          <a:bodyPr lIns="90000" rIns="90000" tIns="45000" bIns="45000" anchor="ctr">
+            <a:noAutofit/>
+          </a:bodyPr>
+          <a:p>
+            <a:pPr algn="ctr">
+              <a:buNone/>
+            </a:pPr>
+            <a:r>
+              <a:rPr b="0" lang="fr-CH" sz="1800" spc="-1" strike="noStrike">
+                <a:latin typeface="Arial"/>
+              </a:rPr>
+              <a:t>Automated execution</a:t>
+            </a:r>
+            <a:endParaRPr b="0" lang="fr-CH" sz="1800" spc="-1" strike="noStrike">
+              <a:latin typeface="Arial"/>
+            </a:endParaRPr>
+          </a:p>
+        </p:txBody>
+      </p:sp>
+      <p:sp>
+        <p:nvSpPr>
+          <p:cNvPr id="93" name=""/>
+          <p:cNvSpPr txBox="1"/>
+          <p:nvPr/>
+        </p:nvSpPr>
+        <p:spPr>
+          <a:xfrm>
+            <a:off x="3441240" y="4140000"/>
+            <a:ext cx="878760" cy="346320"/>
+          </a:xfrm>
+          <a:prstGeom prst="rect">
+            <a:avLst/>
+          </a:prstGeom>
+          <a:noFill/>
+          <a:ln w="0">
+            <a:noFill/>
+          </a:ln>
+        </p:spPr>
+        <p:txBody>
+          <a:bodyPr lIns="90000" rIns="90000" tIns="45000" bIns="45000" anchor="t">
+            <a:noAutofit/>
+          </a:bodyPr>
+          <a:p>
+            <a:r>
+              <a:rPr b="0" lang="fr-CH" sz="1800" spc="-1" strike="noStrike">
+                <a:latin typeface="Arial"/>
+              </a:rPr>
+              <a:t>Master</a:t>
+            </a:r>
+            <a:endParaRPr b="0" lang="fr-CH" sz="1800" spc="-1" strike="noStrike">
+              <a:latin typeface="Arial"/>
+            </a:endParaRPr>
+          </a:p>
+        </p:txBody>
+      </p:sp>
+      <p:sp>
+        <p:nvSpPr>
+          <p:cNvPr id="94" name=""/>
+          <p:cNvSpPr txBox="1"/>
+          <p:nvPr/>
+        </p:nvSpPr>
+        <p:spPr>
+          <a:xfrm>
+            <a:off x="4680000" y="5400000"/>
+            <a:ext cx="1713960" cy="346320"/>
+          </a:xfrm>
+          <a:prstGeom prst="rect">
+            <a:avLst/>
+          </a:prstGeom>
+          <a:noFill/>
+          <a:ln w="0">
+            <a:noFill/>
+          </a:ln>
+        </p:spPr>
+        <p:txBody>
+          <a:bodyPr lIns="90000" rIns="90000" tIns="45000" bIns="45000" anchor="t">
+            <a:noAutofit/>
+          </a:bodyPr>
+          <a:p>
+            <a:r>
+              <a:rPr b="0" lang="fr-CH" sz="1800" spc="-1" strike="noStrike">
+                <a:latin typeface="Arial"/>
+              </a:rPr>
+              <a:t>Supplementary</a:t>
+            </a:r>
+            <a:endParaRPr b="0" lang="fr-CH" sz="1800" spc="-1" strike="noStrike">
+              <a:latin typeface="Arial"/>
+            </a:endParaRPr>
+          </a:p>
+        </p:txBody>
+      </p:sp>
     </p:spTree>
   </p:cSld>
   <mc:AlternateContent>

</xml_diff>